<commit_message>
Updating WVD to AVD
Changing references from WVD to AVD
</commit_message>
<xml_diff>
--- a/Whiteboard design session/WDS trainer presentation - Implementing Windows Virtual Desktop in the enterprise.pptx
+++ b/Whiteboard design session/WDS trainer presentation - Implementing Windows Virtual Desktop in the enterprise.pptx
@@ -234,7 +234,7 @@
           <a:p>
             <a:fld id="{52A13B17-C506-4D51-BB37-16B365906619}" type="datetimeFigureOut">
               <a:rPr lang="en-US" smtClean="0"/>
-              <a:t>9/3/2020</a:t>
+              <a:t>6/14/2021</a:t>
             </a:fld>
             <a:endParaRPr lang="en-US" dirty="0"/>
           </a:p>
@@ -939,7 +939,7 @@
                 <a:ea typeface="+mn-ea"/>
                 <a:cs typeface="+mn-cs"/>
               </a:rPr>
-              <a:t>Common scenario of how Azure Monitor and Network Watcher can be used for both Azure and non-Azure VMs and network connections.  On the right, the on-premises servers are connected to Azure Monitor with an agent and Network Watcher is monitoring the connection between the on-premises datacenter and Azure.  In Azure, Azure Monitor is connected to the Windows Virtual Desktop host pool instances, and network watcher is monitoring the connect to these hosts and the VNET.  The metric and activity log information is then fed into Azure Monitor, Log Analytics, Azure Policy, and Azure Security Center for managing these resources for performance, activity, and compliance.</a:t>
+              <a:t>Common scenario of how Azure Monitor and Network Watcher can be used for both Azure and non-Azure VMs and network connections.  On the right, the on-premises servers are connected to Azure Monitor with an agent and Network Watcher is monitoring the connection between the on-premises datacenter and Azure.  In Azure, Azure Monitor is connected to the Azure Virtual Desktop host pool instances, and network watcher is monitoring the connect to these hosts and the VNET.  The metric and activity log information is then fed into Azure Monitor, Log Analytics, Azure Policy, and Azure Security Center for managing these resources for performance, activity, and compliance.</a:t>
             </a:r>
             <a:endParaRPr lang="en-US" dirty="0"/>
           </a:p>
@@ -1131,7 +1131,7 @@
                 <a:ea typeface="+mn-ea"/>
                 <a:cs typeface="+mn-cs"/>
               </a:rPr>
-              <a:t>Diagram referencing that there are multiple devices that will need to connect to the Windows desktop virtual image for Windows 10 and Microsoft 365 applications via the WVD </a:t>
+              <a:t>Diagram referencing that there are multiple devices that will need to connect to the Windows desktop virtual image for Windows 10 and Microsoft 365 applications via the AVD </a:t>
             </a:r>
             <a:r>
               <a:rPr lang="en-US" sz="1200" b="0" i="0" kern="1200" dirty="0" err="1">
@@ -1663,7 +1663,7 @@
           <a:p>
             <a:r>
               <a:rPr lang="en-US" sz="1200" dirty="0"/>
-              <a:t>In the Whiteboard Design Session (WDS), you will work in groups to design a Windows Virtual Desktop solution using Microsoft 365 and Azure technologies. </a:t>
+              <a:t>In the Whiteboard Design Session (WDS), you will work in groups to design a Azure Virtual Desktop solution using Microsoft 365 and Azure technologies. </a:t>
             </a:r>
           </a:p>
           <a:p>
@@ -1672,7 +1672,7 @@
           <a:p>
             <a:r>
               <a:rPr lang="en-US" sz="1200" dirty="0"/>
-              <a:t>Your solution will consider the necessary Microsoft 365 subscription required for Windows 10 multi-user licensing, as well as the Azure Active Directory and security needs for a healthcare provider. You will need to determine how to connect Azure to the current VMware and Citrix on-premises infrastructure and the connections needed to connect this infrastructure to Azure for application access. Finally, you will need to design the Windows Virtual Desktop solution utilizing Azure virtual machines with availability and scalability to handle 24x7 operations without performance degradation.</a:t>
+              <a:t>Your solution will consider the necessary Microsoft 365 subscription required for Windows 10 multi-user licensing, as well as the Azure Active Directory and security needs for a healthcare provider. You will need to determine how to connect Azure to the current VMware and Citrix on-premises infrastructure and the connections needed to connect this infrastructure to Azure for application access. Finally, you will need to design the Azure Virtual Desktop solution utilizing Azure virtual machines with availability and scalability to handle 24x7 operations without performance degradation.</a:t>
             </a:r>
           </a:p>
           <a:p>
@@ -1681,7 +1681,7 @@
           <a:p>
             <a:r>
               <a:rPr lang="en-US" sz="1200" dirty="0"/>
-              <a:t>At the end of the whiteboard design session, you will be better able to design a solution that leverages Microsoft 365 and Azure technologies together to build a secure and robust Windows Virtual Desktop infrastructure.</a:t>
+              <a:t>At the end of the whiteboard design session, you will be better able to design a solution that leverages Microsoft 365 and Azure technologies together to build a secure and robust Azure Virtual Desktop infrastructure.</a:t>
             </a:r>
           </a:p>
           <a:p>
@@ -1913,7 +1913,7 @@
                 <a:ea typeface="+mn-ea"/>
                 <a:cs typeface="+mn-cs"/>
               </a:rPr>
-              <a:t>Microsoft 365 licenses that support Windows Virtual Desktop include M365 E3, E5, A3, A5, F3, and Business Premium.</a:t>
+              <a:t>Microsoft 365 licenses that support Azure Virtual Desktop include M365 E3, E5, A3, A5, F3, and Business Premium.</a:t>
             </a:r>
           </a:p>
           <a:p>
@@ -2113,7 +2113,7 @@
                 <a:ea typeface="+mn-ea"/>
                 <a:cs typeface="+mn-cs"/>
               </a:rPr>
-              <a:t>A Microsoft 365 Enterprise E5 will be required with Enterprise Mobility + Security E5 to support the full list of requirements outlined by the customer. Microsoft 365 licenses that support Windows Virtual Desktop include M365 E3, E5, A3, A5, F3, and Business Premium. However, the additional requirements for mobile device management, data classification and information protection, and conditional access policies require the E5 and EMS E5 licenses. Business Premium licensing is also only supported to up to 300 users.</a:t>
+              <a:t>A Microsoft 365 Enterprise E5 will be required with Enterprise Mobility + Security E5 to support the full list of requirements outlined by the customer. Microsoft 365 licenses that support Azure Virtual Desktop include M365 E3, E5, A3, A5, F3, and Business Premium. However, the additional requirements for mobile device management, data classification and information protection, and conditional access policies require the E5 and EMS E5 licenses. Business Premium licensing is also only supported to up to 300 users.</a:t>
             </a:r>
           </a:p>
           <a:p>
@@ -2261,7 +2261,7 @@
                 <a:ea typeface="+mn-ea"/>
                 <a:cs typeface="+mn-cs"/>
               </a:rPr>
-              <a:t>Azure Policy initiatives for ISO 27001 and HIPAA should be enabled for the resource groups that are created to govern the Windows Virtual Desktop infrastructure. In addition, Azure Security Center should be upgraded to the Standard tier subscription to properly monitor and alert on control compliance to ISO 27001 and HIPAA standards.</a:t>
+              <a:t>Azure Policy initiatives for ISO 27001 and HIPAA should be enabled for the resource groups that are created to govern the Azure Virtual Desktop infrastructure. In addition, Azure Security Center should be upgraded to the Standard tier subscription to properly monitor and alert on control compliance to ISO 27001 and HIPAA standards.</a:t>
             </a:r>
           </a:p>
           <a:p>
@@ -2511,7 +2511,7 @@
                 <a:ea typeface="+mn-ea"/>
                 <a:cs typeface="+mn-cs"/>
               </a:rPr>
-              <a:t>The cloud identity will be created within Azure Active Directory. This will be the primary identity source for Microsoft 365, Windows Virtual Desktop, and Azure services. User identities from Active Directory Domain Services will be imported into Azure Active Directory to maintain user login credentials. Azure AD Connect will be installed at Contoso Healthcare's data center in order to synchronize user credentials for single sign-on. Password Hash Synchronization will be used so that users have the ability to authenticate through the data center Active Directory services or the cloud Azure Active Directory services.</a:t>
+              <a:t>The cloud identity will be created within Azure Active Directory. This will be the primary identity source for Microsoft 365, Azure Virtual Desktop, and Azure services. User identities from Active Directory Domain Services will be imported into Azure Active Directory to maintain user login credentials. Azure AD Connect will be installed at Contoso Healthcare's data center in order to synchronize user credentials for single sign-on. Password Hash Synchronization will be used so that users have the ability to authenticate through the data center Active Directory services or the cloud Azure Active Directory services.</a:t>
             </a:r>
           </a:p>
           <a:p>
@@ -2561,7 +2561,7 @@
                 <a:ea typeface="+mn-ea"/>
                 <a:cs typeface="+mn-cs"/>
               </a:rPr>
-              <a:t>Azure Files is the preferred method for storage use with Windows Virtual Desktop. In addition, FSLogix can be used in conjunction with Azure Files to manage user virtual desktop profiles. Azure Files must be deployed in the same region as the Virtual Machine pools.</a:t>
+              <a:t>Azure Files is the preferred method for storage use with Azure Virtual Desktop. In addition, FSLogix can be used in conjunction with Azure Files to manage user virtual desktop profiles. Azure Files must be deployed in the same region as the Virtual Machine pools.</a:t>
             </a:r>
           </a:p>
           <a:p>
@@ -2834,7 +2834,7 @@
                 <a:ea typeface="+mn-ea"/>
                 <a:cs typeface="+mn-cs"/>
               </a:rPr>
-              <a:t>The entire Windows Virtual Desktop infrastructure should be created within a single resource group. This will allow for ease of management of the resources and the ability to analyze and review the consumption easily within the Azure subscription.</a:t>
+              <a:t>The entire Azure Virtual Desktop infrastructure should be created within a single resource group. This will allow for ease of management of the resources and the ability to analyze and review the consumption easily within the Azure subscription.</a:t>
             </a:r>
           </a:p>
           <a:p>
@@ -3307,7 +3307,7 @@
                 <a:ea typeface="+mn-ea"/>
                 <a:cs typeface="+mn-cs"/>
               </a:rPr>
-              <a:t>Windows Virtual Desktop image</a:t>
+              <a:t>Azure Virtual Desktop image</a:t>
             </a:r>
             <a:endParaRPr lang="en-US" sz="1200" b="0" i="0" kern="1200" dirty="0">
               <a:solidFill>
@@ -3366,7 +3366,7 @@
                 <a:ea typeface="+mn-ea"/>
                 <a:cs typeface="+mn-cs"/>
               </a:rPr>
-              <a:t>The recommendation would be to create the managed WVD image that Contoso Healthcare is wanting to deliver to their users. Optionally, they could also create a VHD for the standard image. Details on this process are in the links provided in the student guide. Another option is to have an image created with Windows 10 multi-user licensing and Office365 ProPlus at the time of creating the Windows Virtual Desktop host pool, then making adjustments to that image based on custom requirements. You could use the following automated image building solutions to create and manage this image, such as Azure Image Builder (</a:t>
+              <a:t>The recommendation would be to create the managed AVD image that Contoso Healthcare is wanting to deliver to their users. Optionally, they could also create a VHD for the standard image. Details on this process are in the links provided in the student guide. Another option is to have an image created with Windows 10 multi-user licensing and Office365 ProPlus at the time of creating the Azure Virtual Desktop host pool, then making adjustments to that image based on custom requirements. You could use the following automated image building solutions to create and manage this image, such as Azure Image Builder (</a:t>
             </a:r>
             <a:r>
               <a:rPr lang="en-US" sz="1200" b="0" i="0" u="none" strike="noStrike" kern="1200" dirty="0">
@@ -3491,7 +3491,7 @@
                 <a:ea typeface="+mn-ea"/>
                 <a:cs typeface="+mn-cs"/>
               </a:rPr>
-              <a:t>3. What are the connection options for users to access the Windows Virtual Desktop image?</a:t>
+              <a:t>3. What are the connection options for users to access the Azure Virtual Desktop image?</a:t>
             </a:r>
           </a:p>
           <a:p>
@@ -3516,7 +3516,7 @@
                 <a:ea typeface="+mn-ea"/>
                 <a:cs typeface="+mn-cs"/>
               </a:rPr>
-              <a:t>There are multiple connection options for users to access their Windows Virtual Desktop. The Remote Desktop client application can be used with Windows 10, Windows 7, Android, macOS, or iOS. Users can also connect through an HTML5-capable web browser. Since we are unsure of the full scope of operating systems on the 500 existing workstations within Contoso Healthcare, we recommend connection through the web browser on desktop devices and using the Remote Desktop app on mobile devices.</a:t>
+              <a:t>There are multiple connection options for users to access their Azure Virtual Desktop. The Remote Desktop client application can be used with Windows 10, Windows 7, Android, macOS, or iOS. Users can also connect through an HTML5-capable web browser. Since we are unsure of the full scope of operating systems on the 500 existing workstations within Contoso Healthcare, we recommend connection through the web browser on desktop devices and using the Remote Desktop app on mobile devices.</a:t>
             </a:r>
           </a:p>
           <a:p>
@@ -3541,7 +3541,7 @@
                 <a:ea typeface="+mn-ea"/>
                 <a:cs typeface="+mn-cs"/>
               </a:rPr>
-              <a:t>4. What are the minimum system requirements for users to access the Windows Virtual Desktop image?</a:t>
+              <a:t>4. What are the minimum system requirements for users to access the Azure Virtual Desktop image?</a:t>
             </a:r>
           </a:p>
           <a:p>
@@ -3664,7 +3664,7 @@
                 <a:ea typeface="+mn-ea"/>
                 <a:cs typeface="+mn-cs"/>
               </a:rPr>
-              <a:t>Windows Virtual Desktop host pool</a:t>
+              <a:t>Azure Virtual Desktop host pool</a:t>
             </a:r>
           </a:p>
           <a:p>
@@ -3934,7 +3934,7 @@
                 <a:ea typeface="+mn-ea"/>
                 <a:cs typeface="+mn-cs"/>
               </a:rPr>
-              <a:t>The diagram on this slide shows a possible solution for Contoso's Windows Virtual Desktops.  The California datacenter is connecting to the Azure West US region, and the Northern Virginia datacenter is connecting to the East US region utilizing </a:t>
+              <a:t>The diagram on this slide shows a possible solution for Contoso's Azure Virtual Desktops.  The California datacenter is connecting to the Azure West US region, and the Northern Virginia datacenter is connecting to the East US region utilizing </a:t>
             </a:r>
             <a:r>
               <a:rPr lang="en-US" sz="1200" b="0" i="0" kern="1200" dirty="0" err="1">
@@ -3958,7 +3958,31 @@
                 <a:ea typeface="+mn-ea"/>
                 <a:cs typeface="+mn-cs"/>
               </a:rPr>
-              <a:t> to each.  The West US and East US region VNETs are peered for highspeed backbone connection with a pass-through peering allowed from East US to the WVD VM host pool VNET that is peered with West US.</a:t>
+              <a:t> to each.  The West US and East US region VNETs are peered for highspeed backbone connection with a pass-through peering allowed from East US to </a:t>
+            </a:r>
+            <a:r>
+              <a:rPr lang="en-US" sz="1200" b="0" i="0" kern="1200">
+                <a:solidFill>
+                  <a:schemeClr val="tx1"/>
+                </a:solidFill>
+                <a:effectLst/>
+                <a:latin typeface="+mn-lt"/>
+                <a:ea typeface="+mn-ea"/>
+                <a:cs typeface="+mn-cs"/>
+              </a:rPr>
+              <a:t>the AVD </a:t>
+            </a:r>
+            <a:r>
+              <a:rPr lang="en-US" sz="1200" b="0" i="0" kern="1200" dirty="0">
+                <a:solidFill>
+                  <a:schemeClr val="tx1"/>
+                </a:solidFill>
+                <a:effectLst/>
+                <a:latin typeface="+mn-lt"/>
+                <a:ea typeface="+mn-ea"/>
+                <a:cs typeface="+mn-cs"/>
+              </a:rPr>
+              <a:t>VM host pool VNET that is peered with West US.</a:t>
             </a:r>
             <a:endParaRPr lang="en-US" dirty="0"/>
           </a:p>
@@ -4642,7 +4666,7 @@
                   <a:prstClr val="black"/>
                 </a:solidFill>
               </a:rPr>
-              <a:t>9/3/2020 12:43 PM</a:t>
+              <a:t>6/14/2021 3:58 PM</a:t>
             </a:fld>
             <a:endParaRPr lang="en-US" dirty="0">
               <a:solidFill>
@@ -17363,7 +17387,7 @@
           <a:p>
             <a:r>
               <a:rPr lang="en-US" dirty="0"/>
-              <a:t>Implementing Windows Virtual Desktop in the enterprise</a:t>
+              <a:t>Implementing Azure Virtual Desktop in the enterprise</a:t>
             </a:r>
           </a:p>
         </p:txBody>
@@ -18422,7 +18446,7 @@
             </a:pPr>
             <a:r>
               <a:rPr lang="en-US" sz="3600" dirty="0"/>
-              <a:t>Windows Virtual Desktop host pool</a:t>
+              <a:t>Azure Virtual Desktop host pool</a:t>
             </a:r>
           </a:p>
           <a:p>
@@ -19599,7 +19623,7 @@
           <a:p>
             <a:r>
               <a:rPr lang="en-US" sz="2400" dirty="0"/>
-              <a:t>In the whiteboard design session you will work in groups to design a Windows Virtual Desktop solution using Microsoft 365 and Azure technologies. Your solution will consider the necessary Microsoft 365 subscription required for Windows 10 Enterprise multi-user licensing, as well as the Azure Active Directory and security needs for a healthcare provider. You will need to determine how to connect Azure to the current VMware and Citrix on-premises infrastructure and the connections needed to connect this infrastructure to Azure for application access. Finally, you will need to design the Windows Virtual Desktop solution utilizing Azure virtual machines with availability and scalability to handle 24x7 operations without performance degradation.</a:t>
+              <a:t>In the whiteboard design session you will work in groups to design a Azure Virtual Desktop solution using Microsoft 365 and Azure technologies. Your solution will consider the necessary Microsoft 365 subscription required for Windows 10 Enterprise multi-user licensing, as well as the Azure Active Directory and security needs for a healthcare provider. You will need to determine how to connect Azure to the current VMware and Citrix on-premises infrastructure and the connections needed to connect this infrastructure to Azure for application access. Finally, you will need to design the Azure Virtual Desktop solution utilizing Azure virtual machines with availability and scalability to handle 24x7 operations without performance degradation.</a:t>
             </a:r>
           </a:p>
           <a:p>
@@ -19608,7 +19632,7 @@
           <a:p>
             <a:r>
               <a:rPr lang="en-US" sz="2400" dirty="0"/>
-              <a:t>At the end of the whiteboard design session, you will be better able to design a solution that leverages Microsoft 365 and Azure technologies together to build a secure and robust Windows Virtual Desktop infrastructure.</a:t>
+              <a:t>At the end of the whiteboard design session, you will be better able to design a solution that leverages Microsoft 365 and Azure technologies together to build a secure and robust Azure Virtual Desktop infrastructure.</a:t>
             </a:r>
           </a:p>
         </p:txBody>
@@ -19668,7 +19692,7 @@
           <a:p>
             <a:r>
               <a:rPr lang="en-US" sz="4400" dirty="0"/>
-              <a:t>Implementing Windows Virtual Desktop in the enterprise</a:t>
+              <a:t>Implementing Azure Virtual Desktop in the enterprise</a:t>
             </a:r>
             <a:endParaRPr lang="en-US" dirty="0"/>
           </a:p>
@@ -20748,7 +20772,7 @@
           <a:p>
             <a:r>
               <a:rPr lang="en-US" sz="2800" dirty="0"/>
-              <a:t>Managed image through WVD with creating a VHD image as an alternative option</a:t>
+              <a:t>Managed image through AVD with creating a VHD image as an alternative option</a:t>
             </a:r>
           </a:p>
           <a:p>
@@ -20847,7 +20871,7 @@
           <a:p>
             <a:r>
               <a:rPr lang="en-US" sz="4800" dirty="0"/>
-              <a:t>Windows Virtual Desktop host pool</a:t>
+              <a:t>Azure Virtual Desktop host pool</a:t>
             </a:r>
           </a:p>
         </p:txBody>
@@ -21180,7 +21204,7 @@
             </a:pPr>
             <a:r>
               <a:rPr lang="en-US" sz="2400" dirty="0"/>
-              <a:t>Windows Virtual Desktop is flexible in the way that users can access their virtual desktop. The design will utilize web browser access to the virtual desktop on workstations, and the remote desktop app on mobile devices.</a:t>
+              <a:t>Azure Virtual Desktop is flexible in the way that users can access their virtual desktop. The design will utilize web browser access to the virtual desktop on workstations, and the remote desktop app on mobile devices.</a:t>
             </a:r>
             <a:endParaRPr lang="en-US" sz="2400" dirty="0">
               <a:solidFill>
@@ -22087,7 +22111,7 @@
             </a:pPr>
             <a:r>
               <a:rPr lang="en-US" sz="2400" dirty="0"/>
-              <a:t>The designed solution has been architected to integrate the current application delivery configuration through Citrix into the standardized Windows Virtual Desktop image. In addition, Azure AD Connect will be used with hash synchronization to provide a single sign-on environment between the Azure Active Directory identity management and the existing on-premises Active Directory domain. As hardware is depreciated within the current data centers, application servers can be migrated to Azure and the Windows Virtual Desktop image can be updated for the new location of these servers.</a:t>
+              <a:t>The designed solution has been architected to integrate the current application delivery configuration through Citrix into the standardized Azure Virtual Desktop image. In addition, Azure AD Connect will be used with hash synchronization to provide a single sign-on environment between the Azure Active Directory identity management and the existing on-premises Active Directory domain. As hardware is depreciated within the current data centers, application servers can be migrated to Azure and the Azure Virtual Desktop image can be updated for the new location of these servers.</a:t>
             </a:r>
           </a:p>
         </p:txBody>
@@ -24027,6 +24051,21 @@
 </file>
 
 <file path=customXml/item1.xml><?xml version="1.0" encoding="utf-8"?>
+<?mso-contentType ?>
+<FormTemplates xmlns="http://schemas.microsoft.com/sharepoint/v3/contenttype/forms">
+  <Display>DocumentLibraryForm</Display>
+  <Edit>DocumentLibraryForm</Edit>
+  <New>DocumentLibraryForm</New>
+</FormTemplates>
+</file>
+
+<file path=customXml/item2.xml><?xml version="1.0" encoding="utf-8"?>
+<p:properties xmlns:p="http://schemas.microsoft.com/office/2006/metadata/properties" xmlns:xsi="http://www.w3.org/2001/XMLSchema-instance" xmlns:pc="http://schemas.microsoft.com/office/infopath/2007/PartnerControls">
+  <documentManagement/>
+</p:properties>
+</file>
+
+<file path=customXml/item3.xml><?xml version="1.0" encoding="utf-8"?>
 <ct:contentTypeSchema xmlns:ct="http://schemas.microsoft.com/office/2006/metadata/contentType" xmlns:ma="http://schemas.microsoft.com/office/2006/metadata/properties/metaAttributes" ct:_="" ma:_="" ma:contentTypeName="Document" ma:contentTypeID="0x010100BCA4EC527BF874469D7E5FECF7D9FB70" ma:contentTypeVersion="6" ma:contentTypeDescription="Create a new document." ma:contentTypeScope="" ma:versionID="63bcfb01198a5f4cc35071d76a13e973">
   <xsd:schema xmlns:xsd="http://www.w3.org/2001/XMLSchema" xmlns:xs="http://www.w3.org/2001/XMLSchema" xmlns:p="http://schemas.microsoft.com/office/2006/metadata/properties" xmlns:ns2="25b059c1-e0b1-4aae-b8e7-a9c1a20f7312" xmlns:ns3="24937d34-002f-4836-b77c-e21f12df0152" targetNamespace="http://schemas.microsoft.com/office/2006/metadata/properties" ma:root="true" ma:fieldsID="12b927a22a17d3f79cc59c0932bea1cb" ns2:_="" ns3:_="">
     <xsd:import namespace="25b059c1-e0b1-4aae-b8e7-a9c1a20f7312"/>
@@ -24205,36 +24244,10 @@
 </ct:contentTypeSchema>
 </file>
 
-<file path=customXml/item2.xml><?xml version="1.0" encoding="utf-8"?>
-<p:properties xmlns:p="http://schemas.microsoft.com/office/2006/metadata/properties" xmlns:xsi="http://www.w3.org/2001/XMLSchema-instance" xmlns:pc="http://schemas.microsoft.com/office/infopath/2007/PartnerControls">
-  <documentManagement/>
-</p:properties>
-</file>
-
-<file path=customXml/item3.xml><?xml version="1.0" encoding="utf-8"?>
-<?mso-contentType ?>
-<FormTemplates xmlns="http://schemas.microsoft.com/sharepoint/v3/contenttype/forms">
-  <Display>DocumentLibraryForm</Display>
-  <Edit>DocumentLibraryForm</Edit>
-  <New>DocumentLibraryForm</New>
-</FormTemplates>
-</file>
-
 <file path=customXml/itemProps1.xml><?xml version="1.0" encoding="utf-8"?>
-<ds:datastoreItem xmlns:ds="http://schemas.openxmlformats.org/officeDocument/2006/customXml" ds:itemID="{50B43756-F2F7-4341-9ED7-6CDCB2E9AC83}">
+<ds:datastoreItem xmlns:ds="http://schemas.openxmlformats.org/officeDocument/2006/customXml" ds:itemID="{FC7B288A-115F-4EDF-8326-05039CEE1DB1}">
   <ds:schemaRefs>
-    <ds:schemaRef ds:uri="http://schemas.microsoft.com/office/2006/metadata/contentType"/>
-    <ds:schemaRef ds:uri="http://schemas.microsoft.com/office/2006/metadata/properties/metaAttributes"/>
-    <ds:schemaRef ds:uri="http://www.w3.org/2001/XMLSchema"/>
-    <ds:schemaRef ds:uri="http://schemas.microsoft.com/office/2006/metadata/properties"/>
-    <ds:schemaRef ds:uri="25b059c1-e0b1-4aae-b8e7-a9c1a20f7312"/>
-    <ds:schemaRef ds:uri="24937d34-002f-4836-b77c-e21f12df0152"/>
-    <ds:schemaRef ds:uri="http://schemas.microsoft.com/office/2006/documentManagement/types"/>
-    <ds:schemaRef ds:uri="http://schemas.microsoft.com/office/infopath/2007/PartnerControls"/>
-    <ds:schemaRef ds:uri="http://schemas.openxmlformats.org/package/2006/metadata/core-properties"/>
-    <ds:schemaRef ds:uri="http://purl.org/dc/elements/1.1/"/>
-    <ds:schemaRef ds:uri="http://purl.org/dc/terms/"/>
-    <ds:schemaRef ds:uri="http://schemas.microsoft.com/internal/obd"/>
+    <ds:schemaRef ds:uri="http://schemas.microsoft.com/sharepoint/v3/contenttype/forms"/>
   </ds:schemaRefs>
 </ds:datastoreItem>
 </file>
@@ -24257,9 +24270,20 @@
 </file>
 
 <file path=customXml/itemProps3.xml><?xml version="1.0" encoding="utf-8"?>
-<ds:datastoreItem xmlns:ds="http://schemas.openxmlformats.org/officeDocument/2006/customXml" ds:itemID="{FC7B288A-115F-4EDF-8326-05039CEE1DB1}">
+<ds:datastoreItem xmlns:ds="http://schemas.openxmlformats.org/officeDocument/2006/customXml" ds:itemID="{50B43756-F2F7-4341-9ED7-6CDCB2E9AC83}">
   <ds:schemaRefs>
-    <ds:schemaRef ds:uri="http://schemas.microsoft.com/sharepoint/v3/contenttype/forms"/>
+    <ds:schemaRef ds:uri="http://schemas.microsoft.com/office/2006/metadata/contentType"/>
+    <ds:schemaRef ds:uri="http://schemas.microsoft.com/office/2006/metadata/properties/metaAttributes"/>
+    <ds:schemaRef ds:uri="http://www.w3.org/2001/XMLSchema"/>
+    <ds:schemaRef ds:uri="http://schemas.microsoft.com/office/2006/metadata/properties"/>
+    <ds:schemaRef ds:uri="25b059c1-e0b1-4aae-b8e7-a9c1a20f7312"/>
+    <ds:schemaRef ds:uri="24937d34-002f-4836-b77c-e21f12df0152"/>
+    <ds:schemaRef ds:uri="http://schemas.microsoft.com/office/2006/documentManagement/types"/>
+    <ds:schemaRef ds:uri="http://schemas.microsoft.com/office/infopath/2007/PartnerControls"/>
+    <ds:schemaRef ds:uri="http://schemas.openxmlformats.org/package/2006/metadata/core-properties"/>
+    <ds:schemaRef ds:uri="http://purl.org/dc/elements/1.1/"/>
+    <ds:schemaRef ds:uri="http://purl.org/dc/terms/"/>
+    <ds:schemaRef ds:uri="http://schemas.microsoft.com/internal/obd"/>
   </ds:schemaRefs>
 </ds:datastoreItem>
 </file>
</xml_diff>